<commit_message>
updates and new files
</commit_message>
<xml_diff>
--- a/Sounds/intro to building with raspberry pi.pptx
+++ b/Sounds/intro to building with raspberry pi.pptx
@@ -9,8 +9,9 @@
     <p:sldId id="257" r:id="rId3"/>
     <p:sldId id="259" r:id="rId4"/>
     <p:sldId id="260" r:id="rId5"/>
-    <p:sldId id="261" r:id="rId6"/>
-    <p:sldId id="262" r:id="rId7"/>
+    <p:sldId id="263" r:id="rId6"/>
+    <p:sldId id="261" r:id="rId7"/>
+    <p:sldId id="262" r:id="rId8"/>
   </p:sldIdLst>
   <p:sldSz cx="12192000" cy="6858000"/>
   <p:notesSz cx="6858000" cy="9144000"/>
@@ -12688,6 +12689,89 @@
           <p:cNvPr id="2" name="Title 1">
             <a:extLst>
               <a:ext uri="{FF2B5EF4-FFF2-40B4-BE49-F238E27FC236}">
+                <a16:creationId xmlns:a16="http://schemas.microsoft.com/office/drawing/2014/main" id="{9E4F13B3-05C0-ED44-940F-07E992815B91}"/>
+              </a:ext>
+            </a:extLst>
+          </p:cNvPr>
+          <p:cNvSpPr>
+            <a:spLocks noGrp="1"/>
+          </p:cNvSpPr>
+          <p:nvPr>
+            <p:ph type="title"/>
+          </p:nvPr>
+        </p:nvSpPr>
+        <p:spPr/>
+        <p:txBody>
+          <a:bodyPr/>
+          <a:lstStyle/>
+          <a:p>
+            <a:r>
+              <a:rPr lang="en-US" dirty="0"/>
+              <a:t>wiring</a:t>
+            </a:r>
+          </a:p>
+        </p:txBody>
+      </p:sp>
+      <p:sp>
+        <p:nvSpPr>
+          <p:cNvPr id="3" name="Content Placeholder 2">
+            <a:extLst>
+              <a:ext uri="{FF2B5EF4-FFF2-40B4-BE49-F238E27FC236}">
+                <a16:creationId xmlns:a16="http://schemas.microsoft.com/office/drawing/2014/main" id="{9BE69FAB-A10D-0449-8F00-86668788F75F}"/>
+              </a:ext>
+            </a:extLst>
+          </p:cNvPr>
+          <p:cNvSpPr>
+            <a:spLocks noGrp="1"/>
+          </p:cNvSpPr>
+          <p:nvPr>
+            <p:ph idx="1"/>
+          </p:nvPr>
+        </p:nvSpPr>
+        <p:spPr/>
+        <p:txBody>
+          <a:bodyPr/>
+          <a:lstStyle/>
+          <a:p>
+            <a:endParaRPr lang="en-US"/>
+          </a:p>
+        </p:txBody>
+      </p:sp>
+    </p:spTree>
+    <p:extLst>
+      <p:ext uri="{BB962C8B-B14F-4D97-AF65-F5344CB8AC3E}">
+        <p14:creationId xmlns:p14="http://schemas.microsoft.com/office/powerpoint/2010/main" val="3328547319"/>
+      </p:ext>
+    </p:extLst>
+  </p:cSld>
+  <p:clrMapOvr>
+    <a:masterClrMapping/>
+  </p:clrMapOvr>
+</p:sld>
+</file>
+
+<file path=ppt/slides/slide6.xml><?xml version="1.0" encoding="utf-8"?>
+<p:sld xmlns:a="http://schemas.openxmlformats.org/drawingml/2006/main" xmlns:r="http://schemas.openxmlformats.org/officeDocument/2006/relationships" xmlns:p="http://schemas.openxmlformats.org/presentationml/2006/main">
+  <p:cSld>
+    <p:spTree>
+      <p:nvGrpSpPr>
+        <p:cNvPr id="1" name=""/>
+        <p:cNvGrpSpPr/>
+        <p:nvPr/>
+      </p:nvGrpSpPr>
+      <p:grpSpPr>
+        <a:xfrm>
+          <a:off x="0" y="0"/>
+          <a:ext cx="0" cy="0"/>
+          <a:chOff x="0" y="0"/>
+          <a:chExt cx="0" cy="0"/>
+        </a:xfrm>
+      </p:grpSpPr>
+      <p:sp>
+        <p:nvSpPr>
+          <p:cNvPr id="2" name="Title 1">
+            <a:extLst>
+              <a:ext uri="{FF2B5EF4-FFF2-40B4-BE49-F238E27FC236}">
                 <a16:creationId xmlns:a16="http://schemas.microsoft.com/office/drawing/2014/main" id="{4F6416E3-221E-054D-B1F4-4B19FE9AEBFA}"/>
               </a:ext>
             </a:extLst>
@@ -12749,7 +12833,7 @@
 </p:sld>
 </file>
 
-<file path=ppt/slides/slide6.xml><?xml version="1.0" encoding="utf-8"?>
+<file path=ppt/slides/slide7.xml><?xml version="1.0" encoding="utf-8"?>
 <p:sld xmlns:a="http://schemas.openxmlformats.org/drawingml/2006/main" xmlns:r="http://schemas.openxmlformats.org/officeDocument/2006/relationships" xmlns:p="http://schemas.openxmlformats.org/presentationml/2006/main">
   <p:cSld>
     <p:spTree>
@@ -12788,9 +12872,10 @@
           <a:lstStyle/>
           <a:p>
             <a:r>
-              <a:rPr lang="en-US" dirty="0"/>
-              <a:t>interface</a:t>
+              <a:rPr lang="en-US"/>
+              <a:t>What’s next</a:t>
             </a:r>
+            <a:endParaRPr lang="en-US" dirty="0"/>
           </a:p>
         </p:txBody>
       </p:sp>

</xml_diff>